<commit_message>
Methods had a typo (Methonds)
</commit_message>
<xml_diff>
--- a/presentation/medium.pptx
+++ b/presentation/medium.pptx
@@ -6175,7 +6175,7 @@
               </a:lnSpc>
             </a:pPr>
             <a:r>
-              <a:rPr lang="en-US" sz="11500" b="1" spc="200" dirty="0" err="1">
+              <a:rPr lang="en-US" sz="11500" b="1" spc="200" dirty="0">
                 <a:solidFill>
                   <a:schemeClr val="bg1"/>
                 </a:solidFill>
@@ -6183,16 +6183,8 @@
                 <a:ea typeface="Helvetica Neue Medium" panose="02000503000000020004" pitchFamily="2" charset="0"/>
                 <a:cs typeface="Times New Roman" panose="02020603050405020304" pitchFamily="18" charset="0"/>
               </a:rPr>
-              <a:t>Methonds</a:t>
+              <a:t>Methods</a:t>
             </a:r>
-            <a:endParaRPr lang="en-US" sz="11500" b="1" spc="200" dirty="0">
-              <a:solidFill>
-                <a:schemeClr val="bg1"/>
-              </a:solidFill>
-              <a:latin typeface="Garamond" panose="02020404030301010803" pitchFamily="18" charset="0"/>
-              <a:ea typeface="Helvetica Neue Medium" panose="02000503000000020004" pitchFamily="2" charset="0"/>
-              <a:cs typeface="Times New Roman" panose="02020603050405020304" pitchFamily="18" charset="0"/>
-            </a:endParaRPr>
           </a:p>
         </p:txBody>
       </p:sp>

</xml_diff>